<commit_message>
Update DATOS COVID Chile 2022 07 16.pptx
</commit_message>
<xml_diff>
--- a/DATOS COVID Chile 2022 07 16.pptx
+++ b/DATOS COVID Chile 2022 07 16.pptx
@@ -7975,10 +7975,10 @@
       </p:sp>
       <p:pic>
         <p:nvPicPr>
-          <p:cNvPr id="4" name="Picture 3">
-            <a:extLst>
-              <a:ext uri="{FF2B5EF4-FFF2-40B4-BE49-F238E27FC236}">
-                <a16:creationId xmlns:a16="http://schemas.microsoft.com/office/drawing/2014/main" id="{A82520FF-9862-97D7-833C-F3E931CC69AC}"/>
+          <p:cNvPr id="5" name="Picture 4">
+            <a:extLst>
+              <a:ext uri="{FF2B5EF4-FFF2-40B4-BE49-F238E27FC236}">
+                <a16:creationId xmlns:a16="http://schemas.microsoft.com/office/drawing/2014/main" id="{8239161C-C958-45D6-D0D2-5BBC694645AD}"/>
               </a:ext>
             </a:extLst>
           </p:cNvPr>
@@ -7995,8 +7995,8 @@
         </p:blipFill>
         <p:spPr>
           <a:xfrm>
-            <a:off x="2298700" y="958850"/>
-            <a:ext cx="7594600" cy="5448300"/>
+            <a:off x="1727199" y="1017859"/>
+            <a:ext cx="7209367" cy="5247474"/>
           </a:xfrm>
           <a:prstGeom prst="rect">
             <a:avLst/>
@@ -8100,10 +8100,10 @@
       </p:sp>
       <p:pic>
         <p:nvPicPr>
-          <p:cNvPr id="3" name="Picture 2">
-            <a:extLst>
-              <a:ext uri="{FF2B5EF4-FFF2-40B4-BE49-F238E27FC236}">
-                <a16:creationId xmlns:a16="http://schemas.microsoft.com/office/drawing/2014/main" id="{7AFBDCEB-3221-C987-7A90-6F891BAA1D9C}"/>
+          <p:cNvPr id="2" name="Picture 1">
+            <a:extLst>
+              <a:ext uri="{FF2B5EF4-FFF2-40B4-BE49-F238E27FC236}">
+                <a16:creationId xmlns:a16="http://schemas.microsoft.com/office/drawing/2014/main" id="{E4EAB9AE-24B8-0DA9-4C87-FE73086A6604}"/>
               </a:ext>
             </a:extLst>
           </p:cNvPr>
@@ -8120,8 +8120,8 @@
         </p:blipFill>
         <p:spPr>
           <a:xfrm>
-            <a:off x="2266949" y="799044"/>
-            <a:ext cx="7658100" cy="5422900"/>
+            <a:off x="2298700" y="958850"/>
+            <a:ext cx="7594600" cy="5448300"/>
           </a:xfrm>
           <a:prstGeom prst="rect">
             <a:avLst/>

</xml_diff>